<commit_message>
updated powerpoint slide two
</commit_message>
<xml_diff>
--- a/fintech-p2-machine-learning.pptx
+++ b/fintech-p2-machine-learning.pptx
@@ -110,6 +110,11 @@
       </a:defRPr>
     </a:lvl9pPr>
   </p:defaultTextStyle>
+  <p:extLst>
+    <p:ext uri="{EFAFB233-063F-42B5-8137-9DF3F51BA10A}">
+      <p15:sldGuideLst xmlns:p15="http://schemas.microsoft.com/office/powerpoint/2012/main"/>
+    </p:ext>
+  </p:extLst>
 </p:presentation>
 </file>
 
@@ -195,7 +200,7 @@
           <a:p>
             <a:fld id="{EAB9B38E-98B4-4052-A647-B2E345AE83B9}" type="datetimeFigureOut">
               <a:rPr lang="en-US" smtClean="0"/>
-              <a:t>9/15/2021</a:t>
+              <a:t>9/16/2021</a:t>
             </a:fld>
             <a:endParaRPr lang="en-US"/>
           </a:p>
@@ -861,7 +866,7 @@
           <a:p>
             <a:fld id="{7401E369-CE8D-47DF-ABCA-AB270F743799}" type="datetimeFigureOut">
               <a:rPr lang="en-US" smtClean="0"/>
-              <a:t>9/15/2021</a:t>
+              <a:t>9/16/2021</a:t>
             </a:fld>
             <a:endParaRPr lang="en-US"/>
           </a:p>
@@ -1059,7 +1064,7 @@
           <a:p>
             <a:fld id="{7401E369-CE8D-47DF-ABCA-AB270F743799}" type="datetimeFigureOut">
               <a:rPr lang="en-US" smtClean="0"/>
-              <a:t>9/15/2021</a:t>
+              <a:t>9/16/2021</a:t>
             </a:fld>
             <a:endParaRPr lang="en-US"/>
           </a:p>
@@ -1267,7 +1272,7 @@
           <a:p>
             <a:fld id="{7401E369-CE8D-47DF-ABCA-AB270F743799}" type="datetimeFigureOut">
               <a:rPr lang="en-US" smtClean="0"/>
-              <a:t>9/15/2021</a:t>
+              <a:t>9/16/2021</a:t>
             </a:fld>
             <a:endParaRPr lang="en-US"/>
           </a:p>
@@ -1465,7 +1470,7 @@
           <a:p>
             <a:fld id="{7401E369-CE8D-47DF-ABCA-AB270F743799}" type="datetimeFigureOut">
               <a:rPr lang="en-US" smtClean="0"/>
-              <a:t>9/15/2021</a:t>
+              <a:t>9/16/2021</a:t>
             </a:fld>
             <a:endParaRPr lang="en-US"/>
           </a:p>
@@ -1740,7 +1745,7 @@
           <a:p>
             <a:fld id="{7401E369-CE8D-47DF-ABCA-AB270F743799}" type="datetimeFigureOut">
               <a:rPr lang="en-US" smtClean="0"/>
-              <a:t>9/15/2021</a:t>
+              <a:t>9/16/2021</a:t>
             </a:fld>
             <a:endParaRPr lang="en-US"/>
           </a:p>
@@ -2005,7 +2010,7 @@
           <a:p>
             <a:fld id="{7401E369-CE8D-47DF-ABCA-AB270F743799}" type="datetimeFigureOut">
               <a:rPr lang="en-US" smtClean="0"/>
-              <a:t>9/15/2021</a:t>
+              <a:t>9/16/2021</a:t>
             </a:fld>
             <a:endParaRPr lang="en-US"/>
           </a:p>
@@ -2417,7 +2422,7 @@
           <a:p>
             <a:fld id="{7401E369-CE8D-47DF-ABCA-AB270F743799}" type="datetimeFigureOut">
               <a:rPr lang="en-US" smtClean="0"/>
-              <a:t>9/15/2021</a:t>
+              <a:t>9/16/2021</a:t>
             </a:fld>
             <a:endParaRPr lang="en-US"/>
           </a:p>
@@ -2558,7 +2563,7 @@
           <a:p>
             <a:fld id="{7401E369-CE8D-47DF-ABCA-AB270F743799}" type="datetimeFigureOut">
               <a:rPr lang="en-US" smtClean="0"/>
-              <a:t>9/15/2021</a:t>
+              <a:t>9/16/2021</a:t>
             </a:fld>
             <a:endParaRPr lang="en-US"/>
           </a:p>
@@ -2671,7 +2676,7 @@
           <a:p>
             <a:fld id="{7401E369-CE8D-47DF-ABCA-AB270F743799}" type="datetimeFigureOut">
               <a:rPr lang="en-US" smtClean="0"/>
-              <a:t>9/15/2021</a:t>
+              <a:t>9/16/2021</a:t>
             </a:fld>
             <a:endParaRPr lang="en-US"/>
           </a:p>
@@ -2982,7 +2987,7 @@
           <a:p>
             <a:fld id="{7401E369-CE8D-47DF-ABCA-AB270F743799}" type="datetimeFigureOut">
               <a:rPr lang="en-US" smtClean="0"/>
-              <a:t>9/15/2021</a:t>
+              <a:t>9/16/2021</a:t>
             </a:fld>
             <a:endParaRPr lang="en-US"/>
           </a:p>
@@ -3270,7 +3275,7 @@
           <a:p>
             <a:fld id="{7401E369-CE8D-47DF-ABCA-AB270F743799}" type="datetimeFigureOut">
               <a:rPr lang="en-US" smtClean="0"/>
-              <a:t>9/15/2021</a:t>
+              <a:t>9/16/2021</a:t>
             </a:fld>
             <a:endParaRPr lang="en-US"/>
           </a:p>
@@ -3511,7 +3516,7 @@
           <a:p>
             <a:fld id="{7401E369-CE8D-47DF-ABCA-AB270F743799}" type="datetimeFigureOut">
               <a:rPr lang="en-US" smtClean="0"/>
-              <a:t>9/15/2021</a:t>
+              <a:t>9/16/2021</a:t>
             </a:fld>
             <a:endParaRPr lang="en-US"/>
           </a:p>
@@ -4537,8 +4542,8 @@
         </p:nvSpPr>
         <p:spPr>
           <a:xfrm>
-            <a:off x="208231" y="449681"/>
-            <a:ext cx="7134130" cy="4770537"/>
+            <a:off x="199177" y="365125"/>
+            <a:ext cx="7161290" cy="6309420"/>
           </a:xfrm>
           <a:prstGeom prst="rect">
             <a:avLst/>
@@ -4615,9 +4620,46 @@
               <a:buFont typeface="Arial" panose="020B0604020202020204" pitchFamily="34" charset="0"/>
               <a:buChar char="•"/>
             </a:pPr>
+            <a:endParaRPr lang="en-US" sz="2000" dirty="0">
+              <a:solidFill>
+                <a:schemeClr val="bg1"/>
+              </a:solidFill>
+            </a:endParaRPr>
+          </a:p>
+          <a:p>
+            <a:pPr algn="l"/>
+            <a:r>
+              <a:rPr lang="en-US" sz="3600" dirty="0">
+                <a:solidFill>
+                  <a:schemeClr val="bg1"/>
+                </a:solidFill>
+                <a:latin typeface="-apple-system"/>
+              </a:rPr>
+              <a:t>Precision vs. Recall</a:t>
+            </a:r>
+          </a:p>
+          <a:p>
+            <a:pPr algn="l">
+              <a:buFont typeface="Arial" panose="020B0604020202020204" pitchFamily="34" charset="0"/>
+              <a:buChar char="•"/>
+            </a:pPr>
+            <a:r>
+              <a:rPr lang="en-US" sz="2000" b="0" i="0" dirty="0">
+                <a:solidFill>
+                  <a:schemeClr val="bg1">
+                    <a:lumMod val="95000"/>
+                  </a:schemeClr>
+                </a:solidFill>
+                <a:effectLst/>
+                <a:latin typeface="Slack-Lato"/>
+              </a:rPr>
+              <a:t>Because we are predicting stock prices, precision will be more important than recall because the cost of acting is high, but the cost of not acting is low.</a:t>
+            </a:r>
             <a:endParaRPr lang="en-US" sz="1600" b="1" dirty="0">
               <a:solidFill>
-                <a:schemeClr val="bg1"/>
+                <a:schemeClr val="bg1">
+                  <a:lumMod val="95000"/>
+                </a:schemeClr>
               </a:solidFill>
             </a:endParaRPr>
           </a:p>

</xml_diff>

<commit_message>
updated powerpoint bulletpoint on slide two
</commit_message>
<xml_diff>
--- a/fintech-p2-machine-learning.pptx
+++ b/fintech-p2-machine-learning.pptx
@@ -4639,29 +4639,18 @@
             </a:r>
           </a:p>
           <a:p>
-            <a:pPr algn="l">
+            <a:pPr marL="342900" indent="-342900" algn="l">
               <a:buFont typeface="Arial" panose="020B0604020202020204" pitchFamily="34" charset="0"/>
               <a:buChar char="•"/>
             </a:pPr>
             <a:r>
-              <a:rPr lang="en-US" sz="2000" b="0" i="0" dirty="0">
+              <a:rPr lang="en-US" sz="2000" dirty="0">
                 <a:solidFill>
-                  <a:schemeClr val="bg1">
-                    <a:lumMod val="95000"/>
-                  </a:schemeClr>
+                  <a:schemeClr val="bg1"/>
                 </a:solidFill>
-                <a:effectLst/>
-                <a:latin typeface="Slack-Lato"/>
               </a:rPr>
               <a:t>Because we are predicting stock prices, precision will be more important than recall because the cost of acting is high, but the cost of not acting is low.</a:t>
             </a:r>
-            <a:endParaRPr lang="en-US" sz="1600" b="1" dirty="0">
-              <a:solidFill>
-                <a:schemeClr val="bg1">
-                  <a:lumMod val="95000"/>
-                </a:schemeClr>
-              </a:solidFill>
-            </a:endParaRPr>
           </a:p>
           <a:p>
             <a:endParaRPr lang="en-US" sz="1600" b="1" dirty="0">

</xml_diff>

<commit_message>
updated powerpoint screenshot for shallow neural network model results
</commit_message>
<xml_diff>
--- a/fintech-p2-machine-learning.pptx
+++ b/fintech-p2-machine-learning.pptx
@@ -4877,7 +4877,7 @@
                 <a:effectLst/>
                 <a:latin typeface="-apple-system"/>
               </a:rPr>
-              <a:t>Deep Neural Network classification model</a:t>
+              <a:t>Shallow Neural Network classification model</a:t>
             </a:r>
           </a:p>
           <a:p>
@@ -5040,10 +5040,10 @@
       </p:pic>
       <p:pic>
         <p:nvPicPr>
-          <p:cNvPr id="15" name="Picture 14">
-            <a:extLst>
-              <a:ext uri="{FF2B5EF4-FFF2-40B4-BE49-F238E27FC236}">
-                <a16:creationId xmlns:a16="http://schemas.microsoft.com/office/drawing/2014/main" id="{5AD65BAE-42E4-4164-9EF3-D60A9A5392CE}"/>
+          <p:cNvPr id="17" name="Picture 16">
+            <a:extLst>
+              <a:ext uri="{FF2B5EF4-FFF2-40B4-BE49-F238E27FC236}">
+                <a16:creationId xmlns:a16="http://schemas.microsoft.com/office/drawing/2014/main" id="{60196E45-F350-4B35-996E-A5B5944363D7}"/>
               </a:ext>
             </a:extLst>
           </p:cNvPr>
@@ -5060,8 +5060,8 @@
         </p:blipFill>
         <p:spPr>
           <a:xfrm>
-            <a:off x="919681" y="1441958"/>
-            <a:ext cx="3374432" cy="1397743"/>
+            <a:off x="919681" y="5103943"/>
+            <a:ext cx="3374432" cy="1302269"/>
           </a:xfrm>
           <a:prstGeom prst="rect">
             <a:avLst/>
@@ -5070,10 +5070,10 @@
       </p:pic>
       <p:pic>
         <p:nvPicPr>
-          <p:cNvPr id="17" name="Picture 16">
-            <a:extLst>
-              <a:ext uri="{FF2B5EF4-FFF2-40B4-BE49-F238E27FC236}">
-                <a16:creationId xmlns:a16="http://schemas.microsoft.com/office/drawing/2014/main" id="{60196E45-F350-4B35-996E-A5B5944363D7}"/>
+          <p:cNvPr id="3" name="Picture 2">
+            <a:extLst>
+              <a:ext uri="{FF2B5EF4-FFF2-40B4-BE49-F238E27FC236}">
+                <a16:creationId xmlns:a16="http://schemas.microsoft.com/office/drawing/2014/main" id="{38EF9E5B-747C-4A48-A24E-21DC7D2C48DC}"/>
               </a:ext>
             </a:extLst>
           </p:cNvPr>
@@ -5090,8 +5090,8 @@
         </p:blipFill>
         <p:spPr>
           <a:xfrm>
-            <a:off x="919681" y="5103943"/>
-            <a:ext cx="3374432" cy="1302269"/>
+            <a:off x="919681" y="1533066"/>
+            <a:ext cx="3392790" cy="1276580"/>
           </a:xfrm>
           <a:prstGeom prst="rect">
             <a:avLst/>

</xml_diff>